<commit_message>
Setup for Week 4
</commit_message>
<xml_diff>
--- a/Week04-Tours/Homework/ExampleTour.pptx
+++ b/Week04-Tours/Homework/ExampleTour.pptx
@@ -158,10 +158,9 @@
           </a:lstStyle>
           <a:p>
             <a:r>
-              <a:rPr lang="en-US" smtClean="0"/>
+              <a:rPr lang="en-US"/>
               <a:t>Click to edit Master title style</a:t>
             </a:r>
-            <a:endParaRPr lang="en-US"/>
           </a:p>
         </p:txBody>
       </p:sp>
@@ -223,10 +222,9 @@
           </a:lstStyle>
           <a:p>
             <a:r>
-              <a:rPr lang="en-US" smtClean="0"/>
+              <a:rPr lang="en-US"/>
               <a:t>Click to edit Master subtitle style</a:t>
             </a:r>
-            <a:endParaRPr lang="en-US"/>
           </a:p>
         </p:txBody>
       </p:sp>
@@ -247,7 +245,7 @@
           <a:p>
             <a:fld id="{D8862F2C-12C1-455F-815A-C164D68E1F7B}" type="datetimeFigureOut">
               <a:rPr lang="en-US" smtClean="0"/>
-              <a:t>2/11/2020</a:t>
+              <a:t>2/13/2023</a:t>
             </a:fld>
             <a:endParaRPr lang="en-US"/>
           </a:p>
@@ -341,10 +339,9 @@
           <a:lstStyle/>
           <a:p>
             <a:r>
-              <a:rPr lang="en-US" smtClean="0"/>
+              <a:rPr lang="en-US"/>
               <a:t>Click to edit Master title style</a:t>
             </a:r>
-            <a:endParaRPr lang="en-US"/>
           </a:p>
         </p:txBody>
       </p:sp>
@@ -365,38 +362,37 @@
           <a:p>
             <a:pPr lvl="0"/>
             <a:r>
-              <a:rPr lang="en-US" smtClean="0"/>
+              <a:rPr lang="en-US"/>
               <a:t>Click to edit Master text styles</a:t>
             </a:r>
           </a:p>
           <a:p>
             <a:pPr lvl="1"/>
             <a:r>
-              <a:rPr lang="en-US" smtClean="0"/>
+              <a:rPr lang="en-US"/>
               <a:t>Second level</a:t>
             </a:r>
           </a:p>
           <a:p>
             <a:pPr lvl="2"/>
             <a:r>
-              <a:rPr lang="en-US" smtClean="0"/>
+              <a:rPr lang="en-US"/>
               <a:t>Third level</a:t>
             </a:r>
           </a:p>
           <a:p>
             <a:pPr lvl="3"/>
             <a:r>
-              <a:rPr lang="en-US" smtClean="0"/>
+              <a:rPr lang="en-US"/>
               <a:t>Fourth level</a:t>
             </a:r>
           </a:p>
           <a:p>
             <a:pPr lvl="4"/>
             <a:r>
-              <a:rPr lang="en-US" smtClean="0"/>
+              <a:rPr lang="en-US"/>
               <a:t>Fifth level</a:t>
             </a:r>
-            <a:endParaRPr lang="en-US"/>
           </a:p>
         </p:txBody>
       </p:sp>
@@ -417,7 +413,7 @@
           <a:p>
             <a:fld id="{D8862F2C-12C1-455F-815A-C164D68E1F7B}" type="datetimeFigureOut">
               <a:rPr lang="en-US" smtClean="0"/>
-              <a:t>2/11/2020</a:t>
+              <a:t>2/13/2023</a:t>
             </a:fld>
             <a:endParaRPr lang="en-US"/>
           </a:p>
@@ -516,10 +512,9 @@
           <a:lstStyle/>
           <a:p>
             <a:r>
-              <a:rPr lang="en-US" smtClean="0"/>
+              <a:rPr lang="en-US"/>
               <a:t>Click to edit Master title style</a:t>
             </a:r>
-            <a:endParaRPr lang="en-US"/>
           </a:p>
         </p:txBody>
       </p:sp>
@@ -545,38 +540,37 @@
           <a:p>
             <a:pPr lvl="0"/>
             <a:r>
-              <a:rPr lang="en-US" smtClean="0"/>
+              <a:rPr lang="en-US"/>
               <a:t>Click to edit Master text styles</a:t>
             </a:r>
           </a:p>
           <a:p>
             <a:pPr lvl="1"/>
             <a:r>
-              <a:rPr lang="en-US" smtClean="0"/>
+              <a:rPr lang="en-US"/>
               <a:t>Second level</a:t>
             </a:r>
           </a:p>
           <a:p>
             <a:pPr lvl="2"/>
             <a:r>
-              <a:rPr lang="en-US" smtClean="0"/>
+              <a:rPr lang="en-US"/>
               <a:t>Third level</a:t>
             </a:r>
           </a:p>
           <a:p>
             <a:pPr lvl="3"/>
             <a:r>
-              <a:rPr lang="en-US" smtClean="0"/>
+              <a:rPr lang="en-US"/>
               <a:t>Fourth level</a:t>
             </a:r>
           </a:p>
           <a:p>
             <a:pPr lvl="4"/>
             <a:r>
-              <a:rPr lang="en-US" smtClean="0"/>
+              <a:rPr lang="en-US"/>
               <a:t>Fifth level</a:t>
             </a:r>
-            <a:endParaRPr lang="en-US"/>
           </a:p>
         </p:txBody>
       </p:sp>
@@ -597,7 +591,7 @@
           <a:p>
             <a:fld id="{D8862F2C-12C1-455F-815A-C164D68E1F7B}" type="datetimeFigureOut">
               <a:rPr lang="en-US" smtClean="0"/>
-              <a:t>2/11/2020</a:t>
+              <a:t>2/13/2023</a:t>
             </a:fld>
             <a:endParaRPr lang="en-US"/>
           </a:p>
@@ -691,10 +685,9 @@
           <a:lstStyle/>
           <a:p>
             <a:r>
-              <a:rPr lang="en-US" smtClean="0"/>
+              <a:rPr lang="en-US"/>
               <a:t>Click to edit Master title style</a:t>
             </a:r>
-            <a:endParaRPr lang="en-US"/>
           </a:p>
         </p:txBody>
       </p:sp>
@@ -715,38 +708,37 @@
           <a:p>
             <a:pPr lvl="0"/>
             <a:r>
-              <a:rPr lang="en-US" smtClean="0"/>
+              <a:rPr lang="en-US"/>
               <a:t>Click to edit Master text styles</a:t>
             </a:r>
           </a:p>
           <a:p>
             <a:pPr lvl="1"/>
             <a:r>
-              <a:rPr lang="en-US" smtClean="0"/>
+              <a:rPr lang="en-US"/>
               <a:t>Second level</a:t>
             </a:r>
           </a:p>
           <a:p>
             <a:pPr lvl="2"/>
             <a:r>
-              <a:rPr lang="en-US" smtClean="0"/>
+              <a:rPr lang="en-US"/>
               <a:t>Third level</a:t>
             </a:r>
           </a:p>
           <a:p>
             <a:pPr lvl="3"/>
             <a:r>
-              <a:rPr lang="en-US" smtClean="0"/>
+              <a:rPr lang="en-US"/>
               <a:t>Fourth level</a:t>
             </a:r>
           </a:p>
           <a:p>
             <a:pPr lvl="4"/>
             <a:r>
-              <a:rPr lang="en-US" smtClean="0"/>
+              <a:rPr lang="en-US"/>
               <a:t>Fifth level</a:t>
             </a:r>
-            <a:endParaRPr lang="en-US"/>
           </a:p>
         </p:txBody>
       </p:sp>
@@ -767,7 +759,7 @@
           <a:p>
             <a:fld id="{D8862F2C-12C1-455F-815A-C164D68E1F7B}" type="datetimeFigureOut">
               <a:rPr lang="en-US" smtClean="0"/>
-              <a:t>2/11/2020</a:t>
+              <a:t>2/13/2023</a:t>
             </a:fld>
             <a:endParaRPr lang="en-US"/>
           </a:p>
@@ -870,10 +862,9 @@
           </a:lstStyle>
           <a:p>
             <a:r>
-              <a:rPr lang="en-US" smtClean="0"/>
+              <a:rPr lang="en-US"/>
               <a:t>Click to edit Master title style</a:t>
             </a:r>
-            <a:endParaRPr lang="en-US"/>
           </a:p>
         </p:txBody>
       </p:sp>
@@ -990,7 +981,7 @@
           <a:p>
             <a:pPr lvl="0"/>
             <a:r>
-              <a:rPr lang="en-US" smtClean="0"/>
+              <a:rPr lang="en-US"/>
               <a:t>Click to edit Master text styles</a:t>
             </a:r>
           </a:p>
@@ -1013,7 +1004,7 @@
           <a:p>
             <a:fld id="{D8862F2C-12C1-455F-815A-C164D68E1F7B}" type="datetimeFigureOut">
               <a:rPr lang="en-US" smtClean="0"/>
-              <a:t>2/11/2020</a:t>
+              <a:t>2/13/2023</a:t>
             </a:fld>
             <a:endParaRPr lang="en-US"/>
           </a:p>
@@ -1107,10 +1098,9 @@
           <a:lstStyle/>
           <a:p>
             <a:r>
-              <a:rPr lang="en-US" smtClean="0"/>
+              <a:rPr lang="en-US"/>
               <a:t>Click to edit Master title style</a:t>
             </a:r>
-            <a:endParaRPr lang="en-US"/>
           </a:p>
         </p:txBody>
       </p:sp>
@@ -1136,38 +1126,37 @@
           <a:p>
             <a:pPr lvl="0"/>
             <a:r>
-              <a:rPr lang="en-US" smtClean="0"/>
+              <a:rPr lang="en-US"/>
               <a:t>Click to edit Master text styles</a:t>
             </a:r>
           </a:p>
           <a:p>
             <a:pPr lvl="1"/>
             <a:r>
-              <a:rPr lang="en-US" smtClean="0"/>
+              <a:rPr lang="en-US"/>
               <a:t>Second level</a:t>
             </a:r>
           </a:p>
           <a:p>
             <a:pPr lvl="2"/>
             <a:r>
-              <a:rPr lang="en-US" smtClean="0"/>
+              <a:rPr lang="en-US"/>
               <a:t>Third level</a:t>
             </a:r>
           </a:p>
           <a:p>
             <a:pPr lvl="3"/>
             <a:r>
-              <a:rPr lang="en-US" smtClean="0"/>
+              <a:rPr lang="en-US"/>
               <a:t>Fourth level</a:t>
             </a:r>
           </a:p>
           <a:p>
             <a:pPr lvl="4"/>
             <a:r>
-              <a:rPr lang="en-US" smtClean="0"/>
+              <a:rPr lang="en-US"/>
               <a:t>Fifth level</a:t>
             </a:r>
-            <a:endParaRPr lang="en-US"/>
           </a:p>
         </p:txBody>
       </p:sp>
@@ -1193,38 +1182,37 @@
           <a:p>
             <a:pPr lvl="0"/>
             <a:r>
-              <a:rPr lang="en-US" smtClean="0"/>
+              <a:rPr lang="en-US"/>
               <a:t>Click to edit Master text styles</a:t>
             </a:r>
           </a:p>
           <a:p>
             <a:pPr lvl="1"/>
             <a:r>
-              <a:rPr lang="en-US" smtClean="0"/>
+              <a:rPr lang="en-US"/>
               <a:t>Second level</a:t>
             </a:r>
           </a:p>
           <a:p>
             <a:pPr lvl="2"/>
             <a:r>
-              <a:rPr lang="en-US" smtClean="0"/>
+              <a:rPr lang="en-US"/>
               <a:t>Third level</a:t>
             </a:r>
           </a:p>
           <a:p>
             <a:pPr lvl="3"/>
             <a:r>
-              <a:rPr lang="en-US" smtClean="0"/>
+              <a:rPr lang="en-US"/>
               <a:t>Fourth level</a:t>
             </a:r>
           </a:p>
           <a:p>
             <a:pPr lvl="4"/>
             <a:r>
-              <a:rPr lang="en-US" smtClean="0"/>
+              <a:rPr lang="en-US"/>
               <a:t>Fifth level</a:t>
             </a:r>
-            <a:endParaRPr lang="en-US"/>
           </a:p>
         </p:txBody>
       </p:sp>
@@ -1245,7 +1233,7 @@
           <a:p>
             <a:fld id="{D8862F2C-12C1-455F-815A-C164D68E1F7B}" type="datetimeFigureOut">
               <a:rPr lang="en-US" smtClean="0"/>
-              <a:t>2/11/2020</a:t>
+              <a:t>2/13/2023</a:t>
             </a:fld>
             <a:endParaRPr lang="en-US"/>
           </a:p>
@@ -1344,10 +1332,9 @@
           <a:lstStyle/>
           <a:p>
             <a:r>
-              <a:rPr lang="en-US" smtClean="0"/>
+              <a:rPr lang="en-US"/>
               <a:t>Click to edit Master title style</a:t>
             </a:r>
-            <a:endParaRPr lang="en-US"/>
           </a:p>
         </p:txBody>
       </p:sp>
@@ -1410,7 +1397,7 @@
           <a:p>
             <a:pPr lvl="0"/>
             <a:r>
-              <a:rPr lang="en-US" smtClean="0"/>
+              <a:rPr lang="en-US"/>
               <a:t>Click to edit Master text styles</a:t>
             </a:r>
           </a:p>
@@ -1438,38 +1425,37 @@
           <a:p>
             <a:pPr lvl="0"/>
             <a:r>
-              <a:rPr lang="en-US" smtClean="0"/>
+              <a:rPr lang="en-US"/>
               <a:t>Click to edit Master text styles</a:t>
             </a:r>
           </a:p>
           <a:p>
             <a:pPr lvl="1"/>
             <a:r>
-              <a:rPr lang="en-US" smtClean="0"/>
+              <a:rPr lang="en-US"/>
               <a:t>Second level</a:t>
             </a:r>
           </a:p>
           <a:p>
             <a:pPr lvl="2"/>
             <a:r>
-              <a:rPr lang="en-US" smtClean="0"/>
+              <a:rPr lang="en-US"/>
               <a:t>Third level</a:t>
             </a:r>
           </a:p>
           <a:p>
             <a:pPr lvl="3"/>
             <a:r>
-              <a:rPr lang="en-US" smtClean="0"/>
+              <a:rPr lang="en-US"/>
               <a:t>Fourth level</a:t>
             </a:r>
           </a:p>
           <a:p>
             <a:pPr lvl="4"/>
             <a:r>
-              <a:rPr lang="en-US" smtClean="0"/>
+              <a:rPr lang="en-US"/>
               <a:t>Fifth level</a:t>
             </a:r>
-            <a:endParaRPr lang="en-US"/>
           </a:p>
         </p:txBody>
       </p:sp>
@@ -1532,7 +1518,7 @@
           <a:p>
             <a:pPr lvl="0"/>
             <a:r>
-              <a:rPr lang="en-US" smtClean="0"/>
+              <a:rPr lang="en-US"/>
               <a:t>Click to edit Master text styles</a:t>
             </a:r>
           </a:p>
@@ -1560,38 +1546,37 @@
           <a:p>
             <a:pPr lvl="0"/>
             <a:r>
-              <a:rPr lang="en-US" smtClean="0"/>
+              <a:rPr lang="en-US"/>
               <a:t>Click to edit Master text styles</a:t>
             </a:r>
           </a:p>
           <a:p>
             <a:pPr lvl="1"/>
             <a:r>
-              <a:rPr lang="en-US" smtClean="0"/>
+              <a:rPr lang="en-US"/>
               <a:t>Second level</a:t>
             </a:r>
           </a:p>
           <a:p>
             <a:pPr lvl="2"/>
             <a:r>
-              <a:rPr lang="en-US" smtClean="0"/>
+              <a:rPr lang="en-US"/>
               <a:t>Third level</a:t>
             </a:r>
           </a:p>
           <a:p>
             <a:pPr lvl="3"/>
             <a:r>
-              <a:rPr lang="en-US" smtClean="0"/>
+              <a:rPr lang="en-US"/>
               <a:t>Fourth level</a:t>
             </a:r>
           </a:p>
           <a:p>
             <a:pPr lvl="4"/>
             <a:r>
-              <a:rPr lang="en-US" smtClean="0"/>
+              <a:rPr lang="en-US"/>
               <a:t>Fifth level</a:t>
             </a:r>
-            <a:endParaRPr lang="en-US"/>
           </a:p>
         </p:txBody>
       </p:sp>
@@ -1612,7 +1597,7 @@
           <a:p>
             <a:fld id="{D8862F2C-12C1-455F-815A-C164D68E1F7B}" type="datetimeFigureOut">
               <a:rPr lang="en-US" smtClean="0"/>
-              <a:t>2/11/2020</a:t>
+              <a:t>2/13/2023</a:t>
             </a:fld>
             <a:endParaRPr lang="en-US"/>
           </a:p>
@@ -1706,10 +1691,9 @@
           <a:lstStyle/>
           <a:p>
             <a:r>
-              <a:rPr lang="en-US" smtClean="0"/>
+              <a:rPr lang="en-US"/>
               <a:t>Click to edit Master title style</a:t>
             </a:r>
-            <a:endParaRPr lang="en-US"/>
           </a:p>
         </p:txBody>
       </p:sp>
@@ -1730,7 +1714,7 @@
           <a:p>
             <a:fld id="{D8862F2C-12C1-455F-815A-C164D68E1F7B}" type="datetimeFigureOut">
               <a:rPr lang="en-US" smtClean="0"/>
-              <a:t>2/11/2020</a:t>
+              <a:t>2/13/2023</a:t>
             </a:fld>
             <a:endParaRPr lang="en-US"/>
           </a:p>
@@ -1825,7 +1809,7 @@
           <a:p>
             <a:fld id="{D8862F2C-12C1-455F-815A-C164D68E1F7B}" type="datetimeFigureOut">
               <a:rPr lang="en-US" smtClean="0"/>
-              <a:t>2/11/2020</a:t>
+              <a:t>2/13/2023</a:t>
             </a:fld>
             <a:endParaRPr lang="en-US"/>
           </a:p>
@@ -1958,10 +1942,9 @@
           </a:lstStyle>
           <a:p>
             <a:r>
-              <a:rPr lang="en-US" smtClean="0"/>
+              <a:rPr lang="en-US"/>
               <a:t>Click to edit Master title style</a:t>
             </a:r>
-            <a:endParaRPr lang="en-US"/>
           </a:p>
         </p:txBody>
       </p:sp>
@@ -2015,38 +1998,37 @@
           <a:p>
             <a:pPr lvl="0"/>
             <a:r>
-              <a:rPr lang="en-US" smtClean="0"/>
+              <a:rPr lang="en-US"/>
               <a:t>Click to edit Master text styles</a:t>
             </a:r>
           </a:p>
           <a:p>
             <a:pPr lvl="1"/>
             <a:r>
-              <a:rPr lang="en-US" smtClean="0"/>
+              <a:rPr lang="en-US"/>
               <a:t>Second level</a:t>
             </a:r>
           </a:p>
           <a:p>
             <a:pPr lvl="2"/>
             <a:r>
-              <a:rPr lang="en-US" smtClean="0"/>
+              <a:rPr lang="en-US"/>
               <a:t>Third level</a:t>
             </a:r>
           </a:p>
           <a:p>
             <a:pPr lvl="3"/>
             <a:r>
-              <a:rPr lang="en-US" smtClean="0"/>
+              <a:rPr lang="en-US"/>
               <a:t>Fourth level</a:t>
             </a:r>
           </a:p>
           <a:p>
             <a:pPr lvl="4"/>
             <a:r>
-              <a:rPr lang="en-US" smtClean="0"/>
+              <a:rPr lang="en-US"/>
               <a:t>Fifth level</a:t>
             </a:r>
-            <a:endParaRPr lang="en-US"/>
           </a:p>
         </p:txBody>
       </p:sp>
@@ -2109,7 +2091,7 @@
           <a:p>
             <a:pPr lvl="0"/>
             <a:r>
-              <a:rPr lang="en-US" smtClean="0"/>
+              <a:rPr lang="en-US"/>
               <a:t>Click to edit Master text styles</a:t>
             </a:r>
           </a:p>
@@ -2132,7 +2114,7 @@
           <a:p>
             <a:fld id="{D8862F2C-12C1-455F-815A-C164D68E1F7B}" type="datetimeFigureOut">
               <a:rPr lang="en-US" smtClean="0"/>
-              <a:t>2/11/2020</a:t>
+              <a:t>2/13/2023</a:t>
             </a:fld>
             <a:endParaRPr lang="en-US"/>
           </a:p>
@@ -2235,10 +2217,9 @@
           </a:lstStyle>
           <a:p>
             <a:r>
-              <a:rPr lang="en-US" smtClean="0"/>
+              <a:rPr lang="en-US"/>
               <a:t>Click to edit Master title style</a:t>
             </a:r>
-            <a:endParaRPr lang="en-US"/>
           </a:p>
         </p:txBody>
       </p:sp>
@@ -2362,7 +2343,7 @@
           <a:p>
             <a:pPr lvl="0"/>
             <a:r>
-              <a:rPr lang="en-US" smtClean="0"/>
+              <a:rPr lang="en-US"/>
               <a:t>Click to edit Master text styles</a:t>
             </a:r>
           </a:p>
@@ -2385,7 +2366,7 @@
           <a:p>
             <a:fld id="{D8862F2C-12C1-455F-815A-C164D68E1F7B}" type="datetimeFigureOut">
               <a:rPr lang="en-US" smtClean="0"/>
-              <a:t>2/11/2020</a:t>
+              <a:t>2/13/2023</a:t>
             </a:fld>
             <a:endParaRPr lang="en-US"/>
           </a:p>
@@ -2494,10 +2475,9 @@
           <a:lstStyle/>
           <a:p>
             <a:r>
-              <a:rPr lang="en-US" smtClean="0"/>
+              <a:rPr lang="en-US"/>
               <a:t>Click to edit Master title style</a:t>
             </a:r>
-            <a:endParaRPr lang="en-US"/>
           </a:p>
         </p:txBody>
       </p:sp>
@@ -2528,38 +2508,37 @@
           <a:p>
             <a:pPr lvl="0"/>
             <a:r>
-              <a:rPr lang="en-US" smtClean="0"/>
+              <a:rPr lang="en-US"/>
               <a:t>Click to edit Master text styles</a:t>
             </a:r>
           </a:p>
           <a:p>
             <a:pPr lvl="1"/>
             <a:r>
-              <a:rPr lang="en-US" smtClean="0"/>
+              <a:rPr lang="en-US"/>
               <a:t>Second level</a:t>
             </a:r>
           </a:p>
           <a:p>
             <a:pPr lvl="2"/>
             <a:r>
-              <a:rPr lang="en-US" smtClean="0"/>
+              <a:rPr lang="en-US"/>
               <a:t>Third level</a:t>
             </a:r>
           </a:p>
           <a:p>
             <a:pPr lvl="3"/>
             <a:r>
-              <a:rPr lang="en-US" smtClean="0"/>
+              <a:rPr lang="en-US"/>
               <a:t>Fourth level</a:t>
             </a:r>
           </a:p>
           <a:p>
             <a:pPr lvl="4"/>
             <a:r>
-              <a:rPr lang="en-US" smtClean="0"/>
+              <a:rPr lang="en-US"/>
               <a:t>Fifth level</a:t>
             </a:r>
-            <a:endParaRPr lang="en-US"/>
           </a:p>
         </p:txBody>
       </p:sp>
@@ -2598,7 +2577,7 @@
           <a:p>
             <a:fld id="{D8862F2C-12C1-455F-815A-C164D68E1F7B}" type="datetimeFigureOut">
               <a:rPr lang="en-US" smtClean="0"/>
-              <a:t>2/11/2020</a:t>
+              <a:t>2/13/2023</a:t>
             </a:fld>
             <a:endParaRPr lang="en-US"/>
           </a:p>
@@ -3019,10 +2998,9 @@
           <a:lstStyle/>
           <a:p>
             <a:r>
-              <a:rPr lang="en-US" dirty="0" smtClean="0"/>
+              <a:rPr lang="en-US" dirty="0"/>
               <a:t>Example Tour Mockup</a:t>
             </a:r>
-            <a:endParaRPr lang="en-US" dirty="0"/>
           </a:p>
         </p:txBody>
       </p:sp>
@@ -3063,13 +3041,6 @@
       <p:transition spd="slow" advTm="3538"/>
     </mc:Fallback>
   </mc:AlternateContent>
-  <p:timing>
-    <p:tnLst>
-      <p:par>
-        <p:cTn id="1" dur="indefinite" restart="never" nodeType="tmRoot"/>
-      </p:par>
-    </p:tnLst>
-  </p:timing>
 </p:sld>
 </file>
 
@@ -3127,24 +3098,20 @@
           <a:p>
             <a:pPr algn="ctr"/>
             <a:r>
-              <a:rPr lang="en-US" sz="2000" b="1" dirty="0" smtClean="0"/>
+              <a:rPr lang="en-US" sz="2000" b="1" dirty="0"/>
               <a:t>Code tab</a:t>
             </a:r>
-            <a:endParaRPr lang="en-US" b="1" dirty="0" smtClean="0"/>
-          </a:p>
-          <a:p>
-            <a:r>
-              <a:rPr lang="en-US" dirty="0" smtClean="0"/>
-              <a:t>Use </a:t>
-            </a:r>
-            <a:r>
-              <a:rPr lang="en-US" dirty="0" smtClean="0"/>
-              <a:t>the Code tab to browse the files in your repository</a:t>
+            <a:endParaRPr lang="en-US" b="1" dirty="0"/>
+          </a:p>
+          <a:p>
+            <a:r>
+              <a:rPr lang="en-US" dirty="0"/>
+              <a:t>Use the Code tab to browse the files in your repository</a:t>
             </a:r>
           </a:p>
           <a:p>
             <a:pPr algn="just" defTabSz="1087438"/>
-            <a:endParaRPr lang="en-US" sz="1200" dirty="0" smtClean="0">
+            <a:endParaRPr lang="en-US" sz="1200" dirty="0">
               <a:solidFill>
                 <a:schemeClr val="accent1">
                   <a:lumMod val="60000"/>
@@ -3156,7 +3123,7 @@
           <a:p>
             <a:pPr algn="just" defTabSz="1171575"/>
             <a:r>
-              <a:rPr lang="en-US" sz="1200" dirty="0" smtClean="0">
+              <a:rPr lang="en-US" sz="1200" dirty="0">
                 <a:solidFill>
                   <a:schemeClr val="accent1">
                     <a:lumMod val="60000"/>
@@ -3167,7 +3134,7 @@
               <a:t>Back</a:t>
             </a:r>
             <a:r>
-              <a:rPr lang="en-US" sz="1200" dirty="0" smtClean="0"/>
+              <a:rPr lang="en-US" sz="1200" dirty="0"/>
               <a:t>	Next	End</a:t>
             </a:r>
           </a:p>
@@ -3191,13 +3158,6 @@
       <p:transition spd="slow" advTm="4126"/>
     </mc:Fallback>
   </mc:AlternateContent>
-  <p:timing>
-    <p:tnLst>
-      <p:par>
-        <p:cTn id="1" dur="indefinite" restart="never" nodeType="tmRoot"/>
-      </p:par>
-    </p:tnLst>
-  </p:timing>
 </p:sld>
 </file>
 
@@ -3255,18 +3215,14 @@
           <a:p>
             <a:pPr algn="ctr"/>
             <a:r>
-              <a:rPr lang="en-US" sz="2000" b="1" dirty="0" smtClean="0"/>
+              <a:rPr lang="en-US" sz="2000" b="1" dirty="0"/>
               <a:t>Branch button</a:t>
             </a:r>
           </a:p>
           <a:p>
             <a:r>
-              <a:rPr lang="en-US" dirty="0" smtClean="0"/>
-              <a:t>Make </a:t>
-            </a:r>
-            <a:r>
-              <a:rPr lang="en-US" dirty="0" smtClean="0"/>
-              <a:t>sure you select the correct Branch (Winter2020)</a:t>
+              <a:rPr lang="en-US" dirty="0"/>
+              <a:t>Make sure you select the correct Branch (Winter2023)</a:t>
             </a:r>
           </a:p>
           <a:p>
@@ -3292,11 +3248,7 @@
             </a:r>
             <a:r>
               <a:rPr lang="en-US" sz="1400" dirty="0"/>
-              <a:t>	Next	</a:t>
-            </a:r>
-            <a:r>
-              <a:rPr lang="en-US" sz="1400" dirty="0" smtClean="0"/>
-              <a:t>End</a:t>
+              <a:t>	Next	End</a:t>
             </a:r>
             <a:endParaRPr lang="en-US" dirty="0"/>
           </a:p>
@@ -3320,13 +3272,6 @@
       <p:transition spd="slow" advTm="4190"/>
     </mc:Fallback>
   </mc:AlternateContent>
-  <p:timing>
-    <p:tnLst>
-      <p:par>
-        <p:cTn id="1" dur="indefinite" restart="never" nodeType="tmRoot"/>
-      </p:par>
-    </p:tnLst>
-  </p:timing>
 </p:sld>
 </file>
 
@@ -3384,18 +3329,14 @@
           <a:p>
             <a:pPr algn="ctr"/>
             <a:r>
-              <a:rPr lang="en-US" sz="2000" b="1" dirty="0" smtClean="0"/>
+              <a:rPr lang="en-US" sz="2000" b="1" dirty="0"/>
               <a:t>Clone button</a:t>
             </a:r>
           </a:p>
           <a:p>
             <a:r>
-              <a:rPr lang="en-US" dirty="0" smtClean="0"/>
-              <a:t>Click </a:t>
-            </a:r>
-            <a:r>
-              <a:rPr lang="en-US" dirty="0" smtClean="0"/>
-              <a:t>here to get the URL you need to clone the repository locally</a:t>
+              <a:rPr lang="en-US" dirty="0"/>
+              <a:t>Click here to get the URL you need to clone the repository locally</a:t>
             </a:r>
           </a:p>
           <a:p>
@@ -3421,13 +3362,8 @@
             </a:r>
             <a:r>
               <a:rPr lang="en-US" sz="1400" dirty="0"/>
-              <a:t>	Next	</a:t>
-            </a:r>
-            <a:r>
-              <a:rPr lang="en-US" sz="1400" dirty="0" smtClean="0"/>
-              <a:t>End</a:t>
-            </a:r>
-            <a:endParaRPr lang="en-US" sz="1400" dirty="0"/>
+              <a:t>	Next	End</a:t>
+            </a:r>
           </a:p>
         </p:txBody>
       </p:sp>
@@ -3449,13 +3385,6 @@
       <p:transition spd="slow" advTm="3681"/>
     </mc:Fallback>
   </mc:AlternateContent>
-  <p:timing>
-    <p:tnLst>
-      <p:par>
-        <p:cTn id="1" dur="indefinite" restart="never" nodeType="tmRoot"/>
-      </p:par>
-    </p:tnLst>
-  </p:timing>
 </p:sld>
 </file>
 
@@ -3518,18 +3447,14 @@
           <a:p>
             <a:pPr algn="ctr"/>
             <a:r>
-              <a:rPr lang="en-US" sz="2000" b="1" dirty="0" smtClean="0"/>
+              <a:rPr lang="en-US" sz="2000" b="1" dirty="0"/>
               <a:t>Branch tab</a:t>
             </a:r>
           </a:p>
           <a:p>
             <a:r>
-              <a:rPr lang="en-US" dirty="0" smtClean="0"/>
-              <a:t>You </a:t>
-            </a:r>
-            <a:r>
-              <a:rPr lang="en-US" dirty="0" smtClean="0"/>
-              <a:t>can see all the branches in this repository</a:t>
+              <a:rPr lang="en-US" dirty="0"/>
+              <a:t>You can see all the branches in this repository</a:t>
             </a:r>
           </a:p>
           <a:p>
@@ -3570,13 +3495,8 @@
             </a:r>
             <a:r>
               <a:rPr lang="en-US" sz="1400" dirty="0"/>
-              <a:t>	</a:t>
-            </a:r>
-            <a:r>
-              <a:rPr lang="en-US" sz="1400" dirty="0" smtClean="0"/>
-              <a:t>End</a:t>
-            </a:r>
-            <a:endParaRPr lang="en-US" sz="1400" dirty="0"/>
+              <a:t>	End</a:t>
+            </a:r>
           </a:p>
         </p:txBody>
       </p:sp>
@@ -3598,13 +3518,6 @@
       <p:transition spd="slow" advTm="4819"/>
     </mc:Fallback>
   </mc:AlternateContent>
-  <p:timing>
-    <p:tnLst>
-      <p:par>
-        <p:cTn id="1" dur="indefinite" restart="never" nodeType="tmRoot"/>
-      </p:par>
-    </p:tnLst>
-  </p:timing>
 </p:sld>
 </file>
 

</xml_diff>